<commit_message>
Add techie Kubernetes session
</commit_message>
<xml_diff>
--- a/dotNET Core 3 in a nutshell.pptx
+++ b/dotNET Core 3 in a nutshell.pptx
@@ -210,9 +210,7 @@
 
 <file path=ppt/commentAuthors.xml><?xml version="1.0" encoding="utf-8"?>
 <p:cmAuthorLst xmlns:a="http://schemas.openxmlformats.org/drawingml/2006/main" xmlns:r="http://schemas.openxmlformats.org/officeDocument/2006/relationships" xmlns:p="http://schemas.openxmlformats.org/presentationml/2006/main">
-  <p:cmAuthor id="1" name="Paul Gorman" initials="PG" lastIdx="1" clrIdx="0">
-    <p:extLst/>
-  </p:cmAuthor>
+  <p:cmAuthor id="1" name="Paul Gorman" initials="PG" lastIdx="1" clrIdx="0"/>
 </p:cmAuthorLst>
 </file>
 
@@ -4510,7 +4508,7 @@
           <a:p>
             <a:fld id="{9B029D88-685E-574A-819D-76FD4994FA6C}" type="datetimeFigureOut">
               <a:rPr lang="en-US" smtClean="0"/>
-              <a:t>1/24/20</a:t>
+              <a:t>8/7/2020</a:t>
             </a:fld>
             <a:endParaRPr lang="en-US"/>
           </a:p>
@@ -4676,7 +4674,7 @@
           <a:p>
             <a:fld id="{520F3009-D3C3-4163-A41B-F214C387F522}" type="datetimeFigureOut">
               <a:rPr lang="en-GB" smtClean="0"/>
-              <a:t>24/01/2020</a:t>
+              <a:t>07/08/2020</a:t>
             </a:fld>
             <a:endParaRPr lang="en-GB"/>
           </a:p>
@@ -6060,7 +6058,7 @@
           <a:p>
             <a:fld id="{8B62E480-DCCF-CF42-881B-B9C5369F70DD}" type="datetime4">
               <a:rPr lang="en-GB" smtClean="0"/>
-              <a:t>24 January 2020</a:t>
+              <a:t>07 August 2020</a:t>
             </a:fld>
             <a:endParaRPr lang="en-GB"/>
           </a:p>
@@ -6295,7 +6293,7 @@
           <a:p>
             <a:fld id="{CE6A6A1E-5AA8-0C47-9E13-36C75F7BA1F3}" type="datetime4">
               <a:rPr lang="en-GB" smtClean="0"/>
-              <a:t>24 January 2020</a:t>
+              <a:t>07 August 2020</a:t>
             </a:fld>
             <a:endParaRPr lang="en-GB" dirty="0"/>
           </a:p>
@@ -6641,7 +6639,7 @@
           <a:p>
             <a:fld id="{BE3D50E0-16BE-A644-B408-4AAD7A3B51B1}" type="datetime4">
               <a:rPr lang="en-GB" smtClean="0"/>
-              <a:t>24 January 2020</a:t>
+              <a:t>07 August 2020</a:t>
             </a:fld>
             <a:endParaRPr lang="en-GB" dirty="0"/>
           </a:p>
@@ -6962,7 +6960,7 @@
           <a:p>
             <a:fld id="{4E19CC81-D9D8-0046-9DC7-BDB443B80B02}" type="datetime4">
               <a:rPr lang="en-GB" smtClean="0"/>
-              <a:t>24 January 2020</a:t>
+              <a:t>07 August 2020</a:t>
             </a:fld>
             <a:endParaRPr lang="en-GB" dirty="0"/>
           </a:p>
@@ -7219,7 +7217,7 @@
           <a:p>
             <a:fld id="{676BB75B-8A39-2B4E-829E-BB4147F33FB6}" type="datetime4">
               <a:rPr lang="en-GB" smtClean="0"/>
-              <a:t>24 January 2020</a:t>
+              <a:t>07 August 2020</a:t>
             </a:fld>
             <a:endParaRPr lang="en-GB" dirty="0"/>
           </a:p>
@@ -7476,7 +7474,7 @@
           <a:p>
             <a:fld id="{3B9D519F-7045-DA45-A1B5-809904BB7E48}" type="datetime4">
               <a:rPr lang="en-GB" smtClean="0"/>
-              <a:t>24 January 2020</a:t>
+              <a:t>07 August 2020</a:t>
             </a:fld>
             <a:endParaRPr lang="en-GB" dirty="0"/>
           </a:p>
@@ -7733,7 +7731,7 @@
           <a:p>
             <a:fld id="{07861336-7DCB-B14C-9226-AE079C36C436}" type="datetime4">
               <a:rPr lang="en-GB" smtClean="0"/>
-              <a:t>24 January 2020</a:t>
+              <a:t>07 August 2020</a:t>
             </a:fld>
             <a:endParaRPr lang="en-GB" dirty="0"/>
           </a:p>
@@ -8056,7 +8054,7 @@
           <a:p>
             <a:fld id="{96BD5A61-8474-1D43-A8B9-E355C1767F91}" type="datetime4">
               <a:rPr lang="en-GB" smtClean="0"/>
-              <a:t>24 January 2020</a:t>
+              <a:t>07 August 2020</a:t>
             </a:fld>
             <a:endParaRPr lang="en-GB" dirty="0"/>
           </a:p>
@@ -8293,7 +8291,7 @@
           <a:p>
             <a:fld id="{67C82329-E959-3B4F-B5D6-E35FDDB43CC2}" type="datetime4">
               <a:rPr lang="en-GB" smtClean="0"/>
-              <a:t>24 January 2020</a:t>
+              <a:t>07 August 2020</a:t>
             </a:fld>
             <a:endParaRPr lang="en-GB" dirty="0"/>
           </a:p>
@@ -8610,7 +8608,7 @@
           <a:p>
             <a:fld id="{665E0BB9-E525-8341-A7B9-92FC8691878D}" type="datetime4">
               <a:rPr lang="en-GB" smtClean="0"/>
-              <a:t>24 January 2020</a:t>
+              <a:t>07 August 2020</a:t>
             </a:fld>
             <a:endParaRPr lang="en-GB" dirty="0"/>
           </a:p>
@@ -8930,7 +8928,7 @@
           <a:p>
             <a:fld id="{AC915132-C28D-0743-95AA-D2825640C68C}" type="datetime4">
               <a:rPr lang="en-GB" smtClean="0"/>
-              <a:t>24 January 2020</a:t>
+              <a:t>07 August 2020</a:t>
             </a:fld>
             <a:endParaRPr lang="en-GB" dirty="0"/>
           </a:p>
@@ -9283,7 +9281,7 @@
           <a:p>
             <a:fld id="{B14BA664-87AA-9C4A-ADC2-763D4F152A14}" type="datetime4">
               <a:rPr lang="en-GB" smtClean="0"/>
-              <a:t>24 January 2020</a:t>
+              <a:t>07 August 2020</a:t>
             </a:fld>
             <a:endParaRPr lang="en-GB" dirty="0"/>
           </a:p>
@@ -9746,7 +9744,7 @@
           <a:p>
             <a:fld id="{D5663D1B-B3E8-374A-9962-FF408B412CF7}" type="datetime4">
               <a:rPr lang="en-GB" smtClean="0"/>
-              <a:t>24 January 2020</a:t>
+              <a:t>07 August 2020</a:t>
             </a:fld>
             <a:endParaRPr lang="en-GB" dirty="0"/>
           </a:p>
@@ -10105,7 +10103,7 @@
           <a:p>
             <a:fld id="{6ED7A2FA-4636-9243-9FBB-D56BA306D604}" type="datetime4">
               <a:rPr lang="en-GB" smtClean="0"/>
-              <a:t>24 January 2020</a:t>
+              <a:t>07 August 2020</a:t>
             </a:fld>
             <a:endParaRPr lang="en-GB" dirty="0"/>
           </a:p>
@@ -10386,7 +10384,7 @@
           <a:p>
             <a:fld id="{16A5D1FF-FBE0-7648-B9DF-68ED7C1FE808}" type="datetime4">
               <a:rPr lang="en-GB" smtClean="0"/>
-              <a:t>24 January 2020</a:t>
+              <a:t>07 August 2020</a:t>
             </a:fld>
             <a:endParaRPr lang="en-GB" dirty="0"/>
           </a:p>
@@ -10741,7 +10739,7 @@
           <a:p>
             <a:fld id="{858A35C3-C455-7D4B-B97B-E0DAF9FA238A}" type="datetime4">
               <a:rPr lang="en-GB" smtClean="0"/>
-              <a:t>24 January 2020</a:t>
+              <a:t>07 August 2020</a:t>
             </a:fld>
             <a:endParaRPr lang="en-GB" dirty="0"/>
           </a:p>
@@ -11096,7 +11094,7 @@
           <a:p>
             <a:fld id="{77AC66BD-5ED7-D541-A1A5-9C3494A968AB}" type="datetime4">
               <a:rPr lang="en-GB" smtClean="0"/>
-              <a:t>24 January 2020</a:t>
+              <a:t>07 August 2020</a:t>
             </a:fld>
             <a:endParaRPr lang="en-GB" dirty="0"/>
           </a:p>
@@ -11451,7 +11449,7 @@
           <a:p>
             <a:fld id="{F27E477A-49E2-B448-B515-B12F97B372DF}" type="datetime4">
               <a:rPr lang="en-GB" smtClean="0"/>
-              <a:t>24 January 2020</a:t>
+              <a:t>07 August 2020</a:t>
             </a:fld>
             <a:endParaRPr lang="en-GB" dirty="0"/>
           </a:p>
@@ -11788,7 +11786,7 @@
           <a:p>
             <a:fld id="{EDD32D20-5649-9D4E-813E-E3359FC09BFC}" type="datetime4">
               <a:rPr lang="en-GB" smtClean="0"/>
-              <a:t>24 January 2020</a:t>
+              <a:t>07 August 2020</a:t>
             </a:fld>
             <a:endParaRPr lang="en-GB" dirty="0"/>
           </a:p>
@@ -12035,7 +12033,7 @@
           <a:p>
             <a:fld id="{B610A3A1-22DE-3040-90F1-B3B48242AFF1}" type="datetime4">
               <a:rPr lang="en-GB" smtClean="0"/>
-              <a:t>24 January 2020</a:t>
+              <a:t>07 August 2020</a:t>
             </a:fld>
             <a:endParaRPr lang="en-GB"/>
           </a:p>
@@ -12226,7 +12224,7 @@
           <a:p>
             <a:fld id="{082633B1-8C9B-DA49-9036-F6D4AD9B953C}" type="datetime4">
               <a:rPr lang="en-GB" smtClean="0"/>
-              <a:t>24 January 2020</a:t>
+              <a:t>07 August 2020</a:t>
             </a:fld>
             <a:endParaRPr lang="en-GB"/>
           </a:p>
@@ -12509,7 +12507,7 @@
           <a:p>
             <a:fld id="{57BE193C-16E4-7347-BEBA-631B8E1418CA}" type="datetime4">
               <a:rPr lang="en-GB" smtClean="0"/>
-              <a:t>24 January 2020</a:t>
+              <a:t>07 August 2020</a:t>
             </a:fld>
             <a:endParaRPr lang="en-GB"/>
           </a:p>
@@ -12856,7 +12854,7 @@
           <a:p>
             <a:fld id="{F2C60DFE-FB69-4443-B018-8FFFFEE6CDE6}" type="datetime4">
               <a:rPr lang="en-GB" smtClean="0"/>
-              <a:t>24 January 2020</a:t>
+              <a:t>07 August 2020</a:t>
             </a:fld>
             <a:endParaRPr lang="en-GB"/>
           </a:p>
@@ -13176,7 +13174,7 @@
           <a:p>
             <a:fld id="{93C39359-2E0C-8D47-BE60-EF8721F2AB5B}" type="datetime4">
               <a:rPr lang="en-GB" smtClean="0"/>
-              <a:t>24 January 2020</a:t>
+              <a:t>07 August 2020</a:t>
             </a:fld>
             <a:endParaRPr lang="en-GB"/>
           </a:p>
@@ -13496,7 +13494,7 @@
           <a:p>
             <a:fld id="{8A7F9855-F7C4-7C45-ABE9-B0848D0B5709}" type="datetime4">
               <a:rPr lang="en-GB" smtClean="0"/>
-              <a:t>24 January 2020</a:t>
+              <a:t>07 August 2020</a:t>
             </a:fld>
             <a:endParaRPr lang="en-GB"/>
           </a:p>
@@ -13751,7 +13749,7 @@
           <a:p>
             <a:fld id="{607998C2-9E2B-DB42-BB02-9F22A11DF215}" type="datetime4">
               <a:rPr lang="en-GB" smtClean="0"/>
-              <a:t>24 January 2020</a:t>
+              <a:t>07 August 2020</a:t>
             </a:fld>
             <a:endParaRPr lang="en-GB" dirty="0"/>
           </a:p>
@@ -14032,7 +14030,7 @@
           <a:p>
             <a:fld id="{92C8E000-3D66-704D-B67B-344925DAA246}" type="datetime4">
               <a:rPr lang="en-GB" smtClean="0"/>
-              <a:t>24 January 2020</a:t>
+              <a:t>07 August 2020</a:t>
             </a:fld>
             <a:endParaRPr lang="en-GB" dirty="0"/>
           </a:p>
@@ -14419,7 +14417,7 @@
           <a:p>
             <a:fld id="{25BEDC70-FF1D-BB4C-918D-3F1B8009D9C2}" type="datetime4">
               <a:rPr lang="en-GB" smtClean="0"/>
-              <a:t>24 January 2020</a:t>
+              <a:t>07 August 2020</a:t>
             </a:fld>
             <a:endParaRPr lang="en-GB" dirty="0"/>
           </a:p>
@@ -14890,7 +14888,7 @@
             <a:fld id="{376006AC-83BC-4541-AB93-1DED47CDF98C}" type="datetime4">
               <a:rPr lang="en-GB" smtClean="0"/>
               <a:pPr/>
-              <a:t>24 January 2020</a:t>
+              <a:t>07 August 2020</a:t>
             </a:fld>
             <a:endParaRPr lang="en-GB" dirty="0"/>
           </a:p>
@@ -15401,7 +15399,7 @@
       </a:lvl9pPr>
     </p:otherStyle>
   </p:txStyles>
-  <p:extLst mod="1">
+  <p:extLst>
     <p:ext uri="{27BBF7A9-308A-43DC-89C8-2F10F3537804}">
       <p15:sldGuideLst xmlns:p15="http://schemas.microsoft.com/office/powerpoint/2012/main">
         <p15:guide id="1" orient="horz" pos="4321" userDrawn="1">
@@ -15526,7 +15524,7 @@
           <a:p>
             <a:fld id="{30250CFB-E06B-E242-8968-3DFD6708D474}" type="datetime4">
               <a:rPr lang="en-GB" smtClean="0"/>
-              <a:t>24 January 2020</a:t>
+              <a:t>07 August 2020</a:t>
             </a:fld>
             <a:endParaRPr lang="en-GB" dirty="0"/>
           </a:p>
@@ -15647,6 +15645,104 @@
       </p:sp>
       <p:sp>
         <p:nvSpPr>
+          <p:cNvPr id="2" name="Content Placeholder 1">
+            <a:extLst>
+              <a:ext uri="{FF2B5EF4-FFF2-40B4-BE49-F238E27FC236}">
+                <a16:creationId xmlns:a16="http://schemas.microsoft.com/office/drawing/2014/main" id="{1C479743-1890-4772-A01C-1C2AF69B03FF}"/>
+              </a:ext>
+            </a:extLst>
+          </p:cNvPr>
+          <p:cNvSpPr>
+            <a:spLocks noGrp="1"/>
+          </p:cNvSpPr>
+          <p:nvPr>
+            <p:ph idx="1"/>
+          </p:nvPr>
+        </p:nvSpPr>
+        <p:spPr/>
+        <p:txBody>
+          <a:bodyPr/>
+          <a:lstStyle/>
+          <a:p>
+            <a:pPr marL="285750" indent="-285750">
+              <a:buFont typeface="Arial" panose="020B0604020202020204" pitchFamily="34" charset="0"/>
+              <a:buChar char="•"/>
+            </a:pPr>
+            <a:r>
+              <a:rPr lang="en-GB" dirty="0"/>
+              <a:t>Cross-platform, free and open-source managed framework</a:t>
+            </a:r>
+          </a:p>
+          <a:p>
+            <a:pPr marL="285750" indent="-285750">
+              <a:buFont typeface="Arial" panose="020B0604020202020204" pitchFamily="34" charset="0"/>
+              <a:buChar char="•"/>
+            </a:pPr>
+            <a:r>
+              <a:rPr lang="en-GB" dirty="0"/>
+              <a:t>Different from .NET framework, not just a new version of it</a:t>
+            </a:r>
+          </a:p>
+          <a:p>
+            <a:pPr marL="285750" indent="-285750">
+              <a:buFont typeface="Arial" panose="020B0604020202020204" pitchFamily="34" charset="0"/>
+              <a:buChar char="•"/>
+            </a:pPr>
+            <a:r>
+              <a:rPr lang="en-GB" dirty="0"/>
+              <a:t>Designed for microservices (faster and slimmer than .NET Framework)</a:t>
+            </a:r>
+          </a:p>
+          <a:p>
+            <a:pPr marL="285750" indent="-285750">
+              <a:buFont typeface="Arial" panose="020B0604020202020204" pitchFamily="34" charset="0"/>
+              <a:buChar char="•"/>
+            </a:pPr>
+            <a:r>
+              <a:rPr lang="en-GB" dirty="0"/>
+              <a:t>Support UWP and ASP.NET Core. Universal Windows Platform </a:t>
+            </a:r>
+          </a:p>
+          <a:p>
+            <a:pPr marL="515250" lvl="3" indent="-285750">
+              <a:buFont typeface="Arial" panose="020B0604020202020204" pitchFamily="34" charset="0"/>
+              <a:buChar char="•"/>
+            </a:pPr>
+            <a:r>
+              <a:rPr lang="en-GB" dirty="0"/>
+              <a:t>Used to build Console apps / </a:t>
+            </a:r>
+            <a:r>
+              <a:rPr lang="en-GB" dirty="0" err="1"/>
+              <a:t>webapi</a:t>
+            </a:r>
+            <a:r>
+              <a:rPr lang="en-GB" dirty="0"/>
+              <a:t> / </a:t>
+            </a:r>
+            <a:r>
+              <a:rPr lang="en-GB" dirty="0" err="1"/>
+              <a:t>webapps</a:t>
+            </a:r>
+            <a:r>
+              <a:rPr lang="en-GB" dirty="0"/>
+              <a:t> / libraries</a:t>
+            </a:r>
+          </a:p>
+          <a:p>
+            <a:pPr marL="285750" indent="-285750">
+              <a:buFont typeface="Arial" panose="020B0604020202020204" pitchFamily="34" charset="0"/>
+              <a:buChar char="•"/>
+            </a:pPr>
+            <a:endParaRPr lang="en-GB" dirty="0"/>
+          </a:p>
+          <a:p>
+            <a:endParaRPr lang="en-GB" dirty="0"/>
+          </a:p>
+        </p:txBody>
+      </p:sp>
+      <p:sp>
+        <p:nvSpPr>
           <p:cNvPr id="3" name="Date Placeholder 2">
             <a:extLst>
               <a:ext uri="{FF2B5EF4-FFF2-40B4-BE49-F238E27FC236}">
@@ -15668,111 +15764,8 @@
           <a:p>
             <a:fld id="{B14BA664-87AA-9C4A-ADC2-763D4F152A14}" type="datetime4">
               <a:rPr lang="en-GB" smtClean="0"/>
-              <a:t>24 January 2020</a:t>
+              <a:t>07 August 2020</a:t>
             </a:fld>
-            <a:endParaRPr lang="en-GB" dirty="0"/>
-          </a:p>
-        </p:txBody>
-      </p:sp>
-      <p:sp>
-        <p:nvSpPr>
-          <p:cNvPr id="2" name="Content Placeholder 1">
-            <a:extLst>
-              <a:ext uri="{FF2B5EF4-FFF2-40B4-BE49-F238E27FC236}">
-                <a16:creationId xmlns:a16="http://schemas.microsoft.com/office/drawing/2014/main" id="{1C479743-1890-4772-A01C-1C2AF69B03FF}"/>
-              </a:ext>
-            </a:extLst>
-          </p:cNvPr>
-          <p:cNvSpPr>
-            <a:spLocks noGrp="1"/>
-          </p:cNvSpPr>
-          <p:nvPr>
-            <p:ph sz="half" idx="1"/>
-          </p:nvPr>
-        </p:nvSpPr>
-        <p:spPr>
-          <a:xfrm>
-            <a:off x="953689" y="1352947"/>
-            <a:ext cx="7227929" cy="3076177"/>
-          </a:xfrm>
-        </p:spPr>
-        <p:txBody>
-          <a:bodyPr/>
-          <a:lstStyle/>
-          <a:p>
-            <a:pPr marL="285750" indent="-285750">
-              <a:buFont typeface="Arial" panose="020B0604020202020204" pitchFamily="34" charset="0"/>
-              <a:buChar char="•"/>
-            </a:pPr>
-            <a:r>
-              <a:rPr lang="en-GB" dirty="0"/>
-              <a:t>Cross-platform, free and open-source managed framework</a:t>
-            </a:r>
-          </a:p>
-          <a:p>
-            <a:pPr marL="285750" indent="-285750">
-              <a:buFont typeface="Arial" panose="020B0604020202020204" pitchFamily="34" charset="0"/>
-              <a:buChar char="•"/>
-            </a:pPr>
-            <a:r>
-              <a:rPr lang="en-GB" dirty="0"/>
-              <a:t>Different from .NET framework, not just a new version of it</a:t>
-            </a:r>
-          </a:p>
-          <a:p>
-            <a:pPr marL="285750" indent="-285750">
-              <a:buFont typeface="Arial" panose="020B0604020202020204" pitchFamily="34" charset="0"/>
-              <a:buChar char="•"/>
-            </a:pPr>
-            <a:r>
-              <a:rPr lang="en-GB" dirty="0"/>
-              <a:t>Designed for microservices (faster and slimmer than .NET Framework)</a:t>
-            </a:r>
-          </a:p>
-          <a:p>
-            <a:pPr marL="285750" indent="-285750">
-              <a:buFont typeface="Arial" panose="020B0604020202020204" pitchFamily="34" charset="0"/>
-              <a:buChar char="•"/>
-            </a:pPr>
-            <a:r>
-              <a:rPr lang="en-GB" dirty="0"/>
-              <a:t>Support UWP and ASP.NET Core. Universal Windows Platform </a:t>
-            </a:r>
-          </a:p>
-          <a:p>
-            <a:pPr marL="515250" lvl="3" indent="-285750">
-              <a:buFont typeface="Arial" panose="020B0604020202020204" pitchFamily="34" charset="0"/>
-              <a:buChar char="•"/>
-            </a:pPr>
-            <a:r>
-              <a:rPr lang="en-GB" dirty="0"/>
-              <a:t>Used to build Console apps / </a:t>
-            </a:r>
-            <a:r>
-              <a:rPr lang="en-GB" dirty="0" err="1"/>
-              <a:t>webapi</a:t>
-            </a:r>
-            <a:r>
-              <a:rPr lang="en-GB" dirty="0"/>
-              <a:t> / </a:t>
-            </a:r>
-            <a:r>
-              <a:rPr lang="en-GB" dirty="0" err="1"/>
-              <a:t>webapps</a:t>
-            </a:r>
-            <a:r>
-              <a:rPr lang="en-GB" dirty="0"/>
-              <a:t> / libraries</a:t>
-            </a:r>
-          </a:p>
-          <a:p>
-            <a:pPr marL="285750" indent="-285750">
-              <a:buFont typeface="Arial" panose="020B0604020202020204" pitchFamily="34" charset="0"/>
-              <a:buChar char="•"/>
-            </a:pPr>
-            <a:endParaRPr lang="en-GB" dirty="0"/>
-          </a:p>
-          <a:p>
             <a:endParaRPr lang="en-GB" dirty="0"/>
           </a:p>
         </p:txBody>
@@ -15904,6 +15897,31 @@
       </p:sp>
       <p:sp>
         <p:nvSpPr>
+          <p:cNvPr id="13" name="Content Placeholder 12">
+            <a:extLst>
+              <a:ext uri="{FF2B5EF4-FFF2-40B4-BE49-F238E27FC236}">
+                <a16:creationId xmlns:a16="http://schemas.microsoft.com/office/drawing/2014/main" id="{AA63D0E3-7D48-4E51-8524-A120126808F7}"/>
+              </a:ext>
+            </a:extLst>
+          </p:cNvPr>
+          <p:cNvSpPr>
+            <a:spLocks noGrp="1"/>
+          </p:cNvSpPr>
+          <p:nvPr>
+            <p:ph idx="1"/>
+          </p:nvPr>
+        </p:nvSpPr>
+        <p:spPr/>
+        <p:txBody>
+          <a:bodyPr/>
+          <a:lstStyle/>
+          <a:p>
+            <a:endParaRPr lang="en-GB"/>
+          </a:p>
+        </p:txBody>
+      </p:sp>
+      <p:sp>
+        <p:nvSpPr>
           <p:cNvPr id="3" name="Date Placeholder 2">
             <a:extLst>
               <a:ext uri="{FF2B5EF4-FFF2-40B4-BE49-F238E27FC236}">
@@ -15925,7 +15943,7 @@
           <a:p>
             <a:fld id="{B14BA664-87AA-9C4A-ADC2-763D4F152A14}" type="datetime4">
               <a:rPr lang="en-GB" smtClean="0"/>
-              <a:t>24 January 2020</a:t>
+              <a:t>07 August 2020</a:t>
             </a:fld>
             <a:endParaRPr lang="en-GB" dirty="0"/>
           </a:p>
@@ -16086,6 +16104,31 @@
       </p:sp>
       <p:sp>
         <p:nvSpPr>
+          <p:cNvPr id="14" name="Content Placeholder 13">
+            <a:extLst>
+              <a:ext uri="{FF2B5EF4-FFF2-40B4-BE49-F238E27FC236}">
+                <a16:creationId xmlns:a16="http://schemas.microsoft.com/office/drawing/2014/main" id="{D48768D4-27D1-4D30-84CA-6C3E1B00574C}"/>
+              </a:ext>
+            </a:extLst>
+          </p:cNvPr>
+          <p:cNvSpPr>
+            <a:spLocks noGrp="1"/>
+          </p:cNvSpPr>
+          <p:nvPr>
+            <p:ph idx="1"/>
+          </p:nvPr>
+        </p:nvSpPr>
+        <p:spPr/>
+        <p:txBody>
+          <a:bodyPr/>
+          <a:lstStyle/>
+          <a:p>
+            <a:endParaRPr lang="en-GB"/>
+          </a:p>
+        </p:txBody>
+      </p:sp>
+      <p:sp>
+        <p:nvSpPr>
           <p:cNvPr id="3" name="Date Placeholder 2">
             <a:extLst>
               <a:ext uri="{FF2B5EF4-FFF2-40B4-BE49-F238E27FC236}">
@@ -16107,7 +16150,7 @@
           <a:p>
             <a:fld id="{B14BA664-87AA-9C4A-ADC2-763D4F152A14}" type="datetime4">
               <a:rPr lang="en-GB" smtClean="0"/>
-              <a:t>24 January 2020</a:t>
+              <a:t>07 August 2020</a:t>
             </a:fld>
             <a:endParaRPr lang="en-GB" dirty="0"/>
           </a:p>
@@ -16270,6 +16313,77 @@
       </p:sp>
       <p:sp>
         <p:nvSpPr>
+          <p:cNvPr id="2" name="Content Placeholder 1">
+            <a:extLst>
+              <a:ext uri="{FF2B5EF4-FFF2-40B4-BE49-F238E27FC236}">
+                <a16:creationId xmlns:a16="http://schemas.microsoft.com/office/drawing/2014/main" id="{1C479743-1890-4772-A01C-1C2AF69B03FF}"/>
+              </a:ext>
+            </a:extLst>
+          </p:cNvPr>
+          <p:cNvSpPr>
+            <a:spLocks noGrp="1"/>
+          </p:cNvSpPr>
+          <p:nvPr>
+            <p:ph idx="1"/>
+          </p:nvPr>
+        </p:nvSpPr>
+        <p:spPr/>
+        <p:txBody>
+          <a:bodyPr/>
+          <a:lstStyle/>
+          <a:p>
+            <a:endParaRPr lang="en-GB" b="1" dirty="0"/>
+          </a:p>
+          <a:p>
+            <a:r>
+              <a:rPr lang="en-GB" b="1" dirty="0"/>
+              <a:t>Payroll</a:t>
+            </a:r>
+            <a:r>
+              <a:rPr lang="en-GB" dirty="0"/>
+              <a:t> </a:t>
+            </a:r>
+            <a:r>
+              <a:rPr lang="en-GB" dirty="0" err="1"/>
+              <a:t>webapp</a:t>
+            </a:r>
+            <a:r>
+              <a:rPr lang="en-GB" dirty="0"/>
+              <a:t> will be used by HR team to run the integration between Oracle HR and, initially only, the </a:t>
+            </a:r>
+            <a:r>
+              <a:rPr lang="en-GB" dirty="0" err="1"/>
+              <a:t>uk</a:t>
+            </a:r>
+            <a:r>
+              <a:rPr lang="en-GB" dirty="0"/>
+              <a:t> payroll system (</a:t>
+            </a:r>
+            <a:r>
+              <a:rPr lang="en-GB" dirty="0" err="1"/>
+              <a:t>Omnipay</a:t>
+            </a:r>
+            <a:r>
+              <a:rPr lang="en-GB" dirty="0"/>
+              <a:t>)</a:t>
+            </a:r>
+          </a:p>
+          <a:p>
+            <a:endParaRPr lang="en-GB" dirty="0"/>
+          </a:p>
+          <a:p>
+            <a:r>
+              <a:rPr lang="en-GB" dirty="0">
+                <a:hlinkClick r:id="rId3"/>
+              </a:rPr>
+              <a:t>http://gitlab.abcam.com/abcamrepo/payroll</a:t>
+            </a:r>
+            <a:endParaRPr lang="en-GB" dirty="0"/>
+          </a:p>
+        </p:txBody>
+      </p:sp>
+      <p:sp>
+        <p:nvSpPr>
           <p:cNvPr id="3" name="Date Placeholder 2">
             <a:extLst>
               <a:ext uri="{FF2B5EF4-FFF2-40B4-BE49-F238E27FC236}">
@@ -16291,84 +16405,8 @@
           <a:p>
             <a:fld id="{B14BA664-87AA-9C4A-ADC2-763D4F152A14}" type="datetime4">
               <a:rPr lang="en-GB" smtClean="0"/>
-              <a:t>24 January 2020</a:t>
+              <a:t>07 August 2020</a:t>
             </a:fld>
-            <a:endParaRPr lang="en-GB" dirty="0"/>
-          </a:p>
-        </p:txBody>
-      </p:sp>
-      <p:sp>
-        <p:nvSpPr>
-          <p:cNvPr id="2" name="Content Placeholder 1">
-            <a:extLst>
-              <a:ext uri="{FF2B5EF4-FFF2-40B4-BE49-F238E27FC236}">
-                <a16:creationId xmlns:a16="http://schemas.microsoft.com/office/drawing/2014/main" id="{1C479743-1890-4772-A01C-1C2AF69B03FF}"/>
-              </a:ext>
-            </a:extLst>
-          </p:cNvPr>
-          <p:cNvSpPr>
-            <a:spLocks noGrp="1"/>
-          </p:cNvSpPr>
-          <p:nvPr>
-            <p:ph sz="half" idx="1"/>
-          </p:nvPr>
-        </p:nvSpPr>
-        <p:spPr>
-          <a:xfrm>
-            <a:off x="953689" y="1352947"/>
-            <a:ext cx="7227929" cy="3076177"/>
-          </a:xfrm>
-        </p:spPr>
-        <p:txBody>
-          <a:bodyPr/>
-          <a:lstStyle/>
-          <a:p>
-            <a:endParaRPr lang="en-GB" b="1" dirty="0"/>
-          </a:p>
-          <a:p>
-            <a:r>
-              <a:rPr lang="en-GB" b="1" dirty="0"/>
-              <a:t>Payroll</a:t>
-            </a:r>
-            <a:r>
-              <a:rPr lang="en-GB" dirty="0"/>
-              <a:t> </a:t>
-            </a:r>
-            <a:r>
-              <a:rPr lang="en-GB" dirty="0" err="1"/>
-              <a:t>webapp</a:t>
-            </a:r>
-            <a:r>
-              <a:rPr lang="en-GB" dirty="0"/>
-              <a:t> will be used by HR team to run the integration between Oracle HR and, initially only, the </a:t>
-            </a:r>
-            <a:r>
-              <a:rPr lang="en-GB" dirty="0" err="1"/>
-              <a:t>uk</a:t>
-            </a:r>
-            <a:r>
-              <a:rPr lang="en-GB" dirty="0"/>
-              <a:t> payroll system (</a:t>
-            </a:r>
-            <a:r>
-              <a:rPr lang="en-GB" dirty="0" err="1"/>
-              <a:t>Omnipay</a:t>
-            </a:r>
-            <a:r>
-              <a:rPr lang="en-GB" dirty="0"/>
-              <a:t>)</a:t>
-            </a:r>
-          </a:p>
-          <a:p>
-            <a:endParaRPr lang="en-GB" dirty="0"/>
-          </a:p>
-          <a:p>
-            <a:r>
-              <a:rPr lang="en-GB" dirty="0">
-                <a:hlinkClick r:id="rId3"/>
-              </a:rPr>
-              <a:t>http://gitlab.abcam.com/abcamrepo/payroll</a:t>
-            </a:r>
             <a:endParaRPr lang="en-GB" dirty="0"/>
           </a:p>
         </p:txBody>
@@ -16500,6 +16538,164 @@
       </p:sp>
       <p:sp>
         <p:nvSpPr>
+          <p:cNvPr id="2" name="Content Placeholder 1">
+            <a:extLst>
+              <a:ext uri="{FF2B5EF4-FFF2-40B4-BE49-F238E27FC236}">
+                <a16:creationId xmlns:a16="http://schemas.microsoft.com/office/drawing/2014/main" id="{1C479743-1890-4772-A01C-1C2AF69B03FF}"/>
+              </a:ext>
+            </a:extLst>
+          </p:cNvPr>
+          <p:cNvSpPr>
+            <a:spLocks noGrp="1"/>
+          </p:cNvSpPr>
+          <p:nvPr>
+            <p:ph idx="1"/>
+          </p:nvPr>
+        </p:nvSpPr>
+        <p:spPr/>
+        <p:txBody>
+          <a:bodyPr/>
+          <a:lstStyle/>
+          <a:p>
+            <a:pPr marL="285750" indent="-285750">
+              <a:spcAft>
+                <a:spcPts val="1200"/>
+              </a:spcAft>
+              <a:buFont typeface="Arial" panose="020B0604020202020204" pitchFamily="34" charset="0"/>
+              <a:buChar char="•"/>
+            </a:pPr>
+            <a:r>
+              <a:rPr lang="en-GB" dirty="0"/>
+              <a:t>Kestrel</a:t>
+            </a:r>
+          </a:p>
+          <a:p>
+            <a:pPr marL="285750" indent="-285750">
+              <a:spcAft>
+                <a:spcPts val="1200"/>
+              </a:spcAft>
+              <a:buFont typeface="Arial" panose="020B0604020202020204" pitchFamily="34" charset="0"/>
+              <a:buChar char="•"/>
+            </a:pPr>
+            <a:r>
+              <a:rPr lang="en-GB" dirty="0" err="1"/>
+              <a:t>Program.cs</a:t>
+            </a:r>
+            <a:r>
+              <a:rPr lang="en-GB" dirty="0"/>
+              <a:t> and </a:t>
+            </a:r>
+            <a:r>
+              <a:rPr lang="en-GB" dirty="0" err="1"/>
+              <a:t>Startup.cs</a:t>
+            </a:r>
+            <a:r>
+              <a:rPr lang="en-GB" dirty="0"/>
+              <a:t> (</a:t>
+            </a:r>
+            <a:r>
+              <a:rPr lang="en-GB" dirty="0" err="1"/>
+              <a:t>WebServer</a:t>
+            </a:r>
+            <a:r>
+              <a:rPr lang="en-GB" dirty="0"/>
+              <a:t> and Middleware pattern)</a:t>
+            </a:r>
+          </a:p>
+          <a:p>
+            <a:pPr marL="285750" indent="-285750">
+              <a:spcAft>
+                <a:spcPts val="1200"/>
+              </a:spcAft>
+              <a:buFont typeface="Arial" panose="020B0604020202020204" pitchFamily="34" charset="0"/>
+              <a:buChar char="•"/>
+            </a:pPr>
+            <a:r>
+              <a:rPr lang="en-GB" dirty="0"/>
+              <a:t>Configuration (env. Variables)</a:t>
+            </a:r>
+          </a:p>
+          <a:p>
+            <a:pPr marL="285750" indent="-285750">
+              <a:spcAft>
+                <a:spcPts val="1200"/>
+              </a:spcAft>
+              <a:buFont typeface="Arial" panose="020B0604020202020204" pitchFamily="34" charset="0"/>
+              <a:buChar char="•"/>
+            </a:pPr>
+            <a:r>
+              <a:rPr lang="en-GB" dirty="0"/>
+              <a:t>DI</a:t>
+            </a:r>
+          </a:p>
+          <a:p>
+            <a:pPr marL="285750" indent="-285750">
+              <a:spcAft>
+                <a:spcPts val="1200"/>
+              </a:spcAft>
+              <a:buFont typeface="Arial" panose="020B0604020202020204" pitchFamily="34" charset="0"/>
+              <a:buChar char="•"/>
+            </a:pPr>
+            <a:r>
+              <a:rPr lang="en-GB" dirty="0"/>
+              <a:t>Logging</a:t>
+            </a:r>
+          </a:p>
+          <a:p>
+            <a:pPr marL="285750" indent="-285750">
+              <a:spcAft>
+                <a:spcPts val="1200"/>
+              </a:spcAft>
+              <a:buFont typeface="Arial" panose="020B0604020202020204" pitchFamily="34" charset="0"/>
+              <a:buChar char="•"/>
+            </a:pPr>
+            <a:r>
+              <a:rPr lang="en-GB" dirty="0"/>
+              <a:t>From dev pc to web farm</a:t>
+            </a:r>
+          </a:p>
+          <a:p>
+            <a:pPr marL="285750" indent="-285750">
+              <a:spcAft>
+                <a:spcPts val="1200"/>
+              </a:spcAft>
+              <a:buFont typeface="Arial" panose="020B0604020202020204" pitchFamily="34" charset="0"/>
+              <a:buChar char="•"/>
+            </a:pPr>
+            <a:r>
+              <a:rPr lang="en-GB" dirty="0" err="1"/>
+              <a:t>Teamcity</a:t>
+            </a:r>
+            <a:r>
+              <a:rPr lang="en-GB" dirty="0"/>
+              <a:t> and octopus configs</a:t>
+            </a:r>
+          </a:p>
+          <a:p>
+            <a:pPr marL="285750" indent="-285750">
+              <a:spcAft>
+                <a:spcPts val="1200"/>
+              </a:spcAft>
+              <a:buFont typeface="Arial" panose="020B0604020202020204" pitchFamily="34" charset="0"/>
+              <a:buChar char="•"/>
+            </a:pPr>
+            <a:r>
+              <a:rPr lang="en-GB" dirty="0"/>
+              <a:t>How we run </a:t>
+            </a:r>
+            <a:r>
+              <a:rPr lang="en-GB" dirty="0" err="1"/>
+              <a:t>.net</a:t>
+            </a:r>
+            <a:r>
+              <a:rPr lang="en-GB" dirty="0"/>
+              <a:t> core in current stack</a:t>
+            </a:r>
+          </a:p>
+        </p:txBody>
+      </p:sp>
+      <p:sp>
+        <p:nvSpPr>
           <p:cNvPr id="3" name="Date Placeholder 2">
             <a:extLst>
               <a:ext uri="{FF2B5EF4-FFF2-40B4-BE49-F238E27FC236}">
@@ -16521,172 +16717,9 @@
           <a:p>
             <a:fld id="{B14BA664-87AA-9C4A-ADC2-763D4F152A14}" type="datetime4">
               <a:rPr lang="en-GB" smtClean="0"/>
-              <a:t>24 January 2020</a:t>
+              <a:t>07 August 2020</a:t>
             </a:fld>
             <a:endParaRPr lang="en-GB" dirty="0"/>
-          </a:p>
-        </p:txBody>
-      </p:sp>
-      <p:sp>
-        <p:nvSpPr>
-          <p:cNvPr id="2" name="Content Placeholder 1">
-            <a:extLst>
-              <a:ext uri="{FF2B5EF4-FFF2-40B4-BE49-F238E27FC236}">
-                <a16:creationId xmlns:a16="http://schemas.microsoft.com/office/drawing/2014/main" id="{1C479743-1890-4772-A01C-1C2AF69B03FF}"/>
-              </a:ext>
-            </a:extLst>
-          </p:cNvPr>
-          <p:cNvSpPr>
-            <a:spLocks noGrp="1"/>
-          </p:cNvSpPr>
-          <p:nvPr>
-            <p:ph sz="half" idx="1"/>
-          </p:nvPr>
-        </p:nvSpPr>
-        <p:spPr>
-          <a:xfrm>
-            <a:off x="953689" y="1156465"/>
-            <a:ext cx="7227929" cy="3076177"/>
-          </a:xfrm>
-        </p:spPr>
-        <p:txBody>
-          <a:bodyPr/>
-          <a:lstStyle/>
-          <a:p>
-            <a:pPr marL="285750" indent="-285750">
-              <a:spcAft>
-                <a:spcPts val="1200"/>
-              </a:spcAft>
-              <a:buFont typeface="Arial" panose="020B0604020202020204" pitchFamily="34" charset="0"/>
-              <a:buChar char="•"/>
-            </a:pPr>
-            <a:r>
-              <a:rPr lang="en-GB" dirty="0"/>
-              <a:t>Kestrel</a:t>
-            </a:r>
-          </a:p>
-          <a:p>
-            <a:pPr marL="285750" indent="-285750">
-              <a:spcAft>
-                <a:spcPts val="1200"/>
-              </a:spcAft>
-              <a:buFont typeface="Arial" panose="020B0604020202020204" pitchFamily="34" charset="0"/>
-              <a:buChar char="•"/>
-            </a:pPr>
-            <a:r>
-              <a:rPr lang="en-GB" dirty="0" err="1"/>
-              <a:t>Program.cs</a:t>
-            </a:r>
-            <a:r>
-              <a:rPr lang="en-GB" dirty="0"/>
-              <a:t> and </a:t>
-            </a:r>
-            <a:r>
-              <a:rPr lang="en-GB" dirty="0" err="1"/>
-              <a:t>Startup.cs</a:t>
-            </a:r>
-            <a:r>
-              <a:rPr lang="en-GB" dirty="0"/>
-              <a:t> (</a:t>
-            </a:r>
-            <a:r>
-              <a:rPr lang="en-GB" dirty="0" err="1"/>
-              <a:t>WebServer</a:t>
-            </a:r>
-            <a:r>
-              <a:rPr lang="en-GB" dirty="0"/>
-              <a:t> and Middleware pattern)</a:t>
-            </a:r>
-          </a:p>
-          <a:p>
-            <a:pPr marL="285750" indent="-285750">
-              <a:spcAft>
-                <a:spcPts val="1200"/>
-              </a:spcAft>
-              <a:buFont typeface="Arial" panose="020B0604020202020204" pitchFamily="34" charset="0"/>
-              <a:buChar char="•"/>
-            </a:pPr>
-            <a:r>
-              <a:rPr lang="en-GB" dirty="0"/>
-              <a:t>Configuration (env. Variables)</a:t>
-            </a:r>
-          </a:p>
-          <a:p>
-            <a:pPr marL="285750" indent="-285750">
-              <a:spcAft>
-                <a:spcPts val="1200"/>
-              </a:spcAft>
-              <a:buFont typeface="Arial" panose="020B0604020202020204" pitchFamily="34" charset="0"/>
-              <a:buChar char="•"/>
-            </a:pPr>
-            <a:r>
-              <a:rPr lang="en-GB" dirty="0"/>
-              <a:t>DI</a:t>
-            </a:r>
-          </a:p>
-          <a:p>
-            <a:pPr marL="285750" indent="-285750">
-              <a:spcAft>
-                <a:spcPts val="1200"/>
-              </a:spcAft>
-              <a:buFont typeface="Arial" panose="020B0604020202020204" pitchFamily="34" charset="0"/>
-              <a:buChar char="•"/>
-            </a:pPr>
-            <a:r>
-              <a:rPr lang="en-GB" dirty="0"/>
-              <a:t>Logging</a:t>
-            </a:r>
-          </a:p>
-          <a:p>
-            <a:pPr marL="285750" indent="-285750">
-              <a:spcAft>
-                <a:spcPts val="1200"/>
-              </a:spcAft>
-              <a:buFont typeface="Arial" panose="020B0604020202020204" pitchFamily="34" charset="0"/>
-              <a:buChar char="•"/>
-            </a:pPr>
-            <a:r>
-              <a:rPr lang="en-GB" dirty="0"/>
-              <a:t>From dev pc to web farm</a:t>
-            </a:r>
-          </a:p>
-          <a:p>
-            <a:pPr marL="285750" indent="-285750">
-              <a:spcAft>
-                <a:spcPts val="1200"/>
-              </a:spcAft>
-              <a:buFont typeface="Arial" panose="020B0604020202020204" pitchFamily="34" charset="0"/>
-              <a:buChar char="•"/>
-            </a:pPr>
-            <a:r>
-              <a:rPr lang="en-GB" dirty="0" err="1"/>
-              <a:t>Teamcity</a:t>
-            </a:r>
-            <a:r>
-              <a:rPr lang="en-GB" dirty="0"/>
-              <a:t> and octopus configs</a:t>
-            </a:r>
-          </a:p>
-          <a:p>
-            <a:pPr marL="285750" indent="-285750">
-              <a:spcAft>
-                <a:spcPts val="1200"/>
-              </a:spcAft>
-              <a:buFont typeface="Arial" panose="020B0604020202020204" pitchFamily="34" charset="0"/>
-              <a:buChar char="•"/>
-            </a:pPr>
-            <a:r>
-              <a:rPr lang="en-GB" dirty="0"/>
-              <a:t>How we run </a:t>
-            </a:r>
-            <a:r>
-              <a:rPr lang="en-GB" dirty="0" err="1"/>
-              <a:t>.net</a:t>
-            </a:r>
-            <a:r>
-              <a:rPr lang="en-GB" dirty="0"/>
-              <a:t> core in current stack</a:t>
-            </a:r>
           </a:p>
         </p:txBody>
       </p:sp>
@@ -16817,6 +16850,51 @@
       </p:sp>
       <p:sp>
         <p:nvSpPr>
+          <p:cNvPr id="2" name="Content Placeholder 1">
+            <a:extLst>
+              <a:ext uri="{FF2B5EF4-FFF2-40B4-BE49-F238E27FC236}">
+                <a16:creationId xmlns:a16="http://schemas.microsoft.com/office/drawing/2014/main" id="{1C479743-1890-4772-A01C-1C2AF69B03FF}"/>
+              </a:ext>
+            </a:extLst>
+          </p:cNvPr>
+          <p:cNvSpPr>
+            <a:spLocks noGrp="1"/>
+          </p:cNvSpPr>
+          <p:nvPr>
+            <p:ph idx="1"/>
+          </p:nvPr>
+        </p:nvSpPr>
+        <p:spPr/>
+        <p:txBody>
+          <a:bodyPr/>
+          <a:lstStyle/>
+          <a:p>
+            <a:pPr marL="285750" indent="-285750">
+              <a:buFont typeface="Arial" panose="020B0604020202020204" pitchFamily="34" charset="0"/>
+              <a:buChar char="•"/>
+            </a:pPr>
+            <a:r>
+              <a:rPr lang="en-GB" dirty="0"/>
+              <a:t>Cross-platform webserver for ASP.NET Core</a:t>
+            </a:r>
+          </a:p>
+          <a:p>
+            <a:pPr marL="285750" indent="-285750">
+              <a:buFont typeface="Arial" panose="020B0604020202020204" pitchFamily="34" charset="0"/>
+              <a:buChar char="•"/>
+            </a:pPr>
+            <a:r>
+              <a:rPr lang="en-GB" dirty="0"/>
+              <a:t>Can be used alone or behind a reverse-proxy</a:t>
+            </a:r>
+          </a:p>
+          <a:p>
+            <a:endParaRPr lang="en-GB" dirty="0"/>
+          </a:p>
+        </p:txBody>
+      </p:sp>
+      <p:sp>
+        <p:nvSpPr>
           <p:cNvPr id="3" name="Date Placeholder 2">
             <a:extLst>
               <a:ext uri="{FF2B5EF4-FFF2-40B4-BE49-F238E27FC236}">
@@ -16838,58 +16916,8 @@
           <a:p>
             <a:fld id="{B14BA664-87AA-9C4A-ADC2-763D4F152A14}" type="datetime4">
               <a:rPr lang="en-GB" smtClean="0"/>
-              <a:t>24 January 2020</a:t>
+              <a:t>07 August 2020</a:t>
             </a:fld>
-            <a:endParaRPr lang="en-GB" dirty="0"/>
-          </a:p>
-        </p:txBody>
-      </p:sp>
-      <p:sp>
-        <p:nvSpPr>
-          <p:cNvPr id="2" name="Content Placeholder 1">
-            <a:extLst>
-              <a:ext uri="{FF2B5EF4-FFF2-40B4-BE49-F238E27FC236}">
-                <a16:creationId xmlns:a16="http://schemas.microsoft.com/office/drawing/2014/main" id="{1C479743-1890-4772-A01C-1C2AF69B03FF}"/>
-              </a:ext>
-            </a:extLst>
-          </p:cNvPr>
-          <p:cNvSpPr>
-            <a:spLocks noGrp="1"/>
-          </p:cNvSpPr>
-          <p:nvPr>
-            <p:ph sz="half" idx="1"/>
-          </p:nvPr>
-        </p:nvSpPr>
-        <p:spPr>
-          <a:xfrm>
-            <a:off x="953689" y="1156465"/>
-            <a:ext cx="7227929" cy="3076177"/>
-          </a:xfrm>
-        </p:spPr>
-        <p:txBody>
-          <a:bodyPr/>
-          <a:lstStyle/>
-          <a:p>
-            <a:pPr marL="285750" indent="-285750">
-              <a:buFont typeface="Arial" panose="020B0604020202020204" pitchFamily="34" charset="0"/>
-              <a:buChar char="•"/>
-            </a:pPr>
-            <a:r>
-              <a:rPr lang="en-GB" dirty="0"/>
-              <a:t>Cross-platform webserver for ASP.NET Core</a:t>
-            </a:r>
-          </a:p>
-          <a:p>
-            <a:pPr marL="285750" indent="-285750">
-              <a:buFont typeface="Arial" panose="020B0604020202020204" pitchFamily="34" charset="0"/>
-              <a:buChar char="•"/>
-            </a:pPr>
-            <a:r>
-              <a:rPr lang="en-GB" dirty="0"/>
-              <a:t>Can be used alone or behind a reverse-proxy</a:t>
-            </a:r>
-          </a:p>
-          <a:p>
             <a:endParaRPr lang="en-GB" dirty="0"/>
           </a:p>
         </p:txBody>

</xml_diff>